<commit_message>
added weekly presentation deck
</commit_message>
<xml_diff>
--- a/admin/weekly-updates/AAFC_Capstone_week2.pptx
+++ b/admin/weekly-updates/AAFC_Capstone_week2.pptx
@@ -5,24 +5,23 @@
     <p:sldMasterId id="2147483658" r:id="rId1"/>
   </p:sldMasterIdLst>
   <p:notesMasterIdLst>
-    <p:notesMasterId r:id="rId9"/>
+    <p:notesMasterId r:id="rId8"/>
   </p:notesMasterIdLst>
   <p:sldIdLst>
     <p:sldId id="258" r:id="rId2"/>
     <p:sldId id="299" r:id="rId3"/>
     <p:sldId id="301" r:id="rId4"/>
     <p:sldId id="302" r:id="rId5"/>
-    <p:sldId id="303" r:id="rId6"/>
-    <p:sldId id="298" r:id="rId7"/>
-    <p:sldId id="295" r:id="rId8"/>
+    <p:sldId id="298" r:id="rId6"/>
+    <p:sldId id="295" r:id="rId7"/>
   </p:sldIdLst>
   <p:sldSz cx="9144000" cy="5143500" type="screen16x9"/>
   <p:notesSz cx="6858000" cy="9144000"/>
   <p:embeddedFontLst>
     <p:embeddedFont>
-      <p:font typeface="Quicksand" panose="020B0604020202020204" charset="0"/>
-      <p:regular r:id="rId10"/>
-      <p:bold r:id="rId11"/>
+      <p:font typeface="Quicksand" pitchFamily="2" charset="77"/>
+      <p:regular r:id="rId9"/>
+      <p:bold r:id="rId10"/>
     </p:embeddedFont>
   </p:embeddedFontLst>
   <p:defaultTextStyle>
@@ -4071,7 +4070,7 @@
                   <a:schemeClr val="dk1"/>
                 </a:solidFill>
               </a:rPr>
-              <a:t>Week 2 Report</a:t>
+              <a:t>Week 1 Report</a:t>
             </a:r>
             <a:endParaRPr sz="2000" b="1" dirty="0">
               <a:solidFill>
@@ -4564,10 +4563,10 @@
         </p:nvGrpSpPr>
         <p:grpSpPr>
           <a:xfrm>
-            <a:off x="2749358" y="941852"/>
-            <a:ext cx="4222913" cy="774627"/>
-            <a:chOff x="1954243" y="29441"/>
-            <a:chExt cx="4222913" cy="774627"/>
+            <a:off x="2749360" y="941852"/>
+            <a:ext cx="4222911" cy="774627"/>
+            <a:chOff x="1954245" y="29441"/>
+            <a:chExt cx="4222911" cy="774627"/>
           </a:xfrm>
         </p:grpSpPr>
         <p:sp>
@@ -4646,7 +4645,7 @@
           </p:nvSpPr>
           <p:spPr>
             <a:xfrm>
-              <a:off x="1954243" y="262159"/>
+              <a:off x="1954245" y="181035"/>
               <a:ext cx="4185097" cy="481029"/>
             </a:xfrm>
             <a:prstGeom prst="rect">
@@ -4693,7 +4692,7 @@
               </a:pPr>
               <a:r>
                 <a:rPr lang="en-GB" sz="1100" kern="1200" dirty="0"/>
-                <a:t>Dealing with anomalies</a:t>
+                <a:t>Overview of the project</a:t>
               </a:r>
             </a:p>
             <a:p>
@@ -4712,7 +4711,7 @@
               </a:pPr>
               <a:r>
                 <a:rPr lang="en-GB" sz="1100" kern="1200" dirty="0"/>
-                <a:t>Standardizing column names</a:t>
+                <a:t>Aims and Objectives</a:t>
               </a:r>
             </a:p>
             <a:p>
@@ -4731,40 +4730,7 @@
               </a:pPr>
               <a:r>
                 <a:rPr lang="en-GB" sz="1100" kern="1200" dirty="0"/>
-                <a:t>Merging Datasets and doing Transformations</a:t>
-              </a:r>
-            </a:p>
-            <a:p>
-              <a:pPr lvl="2" defTabSz="488950">
-                <a:lnSpc>
-                  <a:spcPct val="90000"/>
-                </a:lnSpc>
-                <a:spcBef>
-                  <a:spcPct val="0"/>
-                </a:spcBef>
-                <a:spcAft>
-                  <a:spcPct val="15000"/>
-                </a:spcAft>
-              </a:pPr>
-              <a:endParaRPr lang="en-GB" sz="1100" kern="1200" dirty="0"/>
-            </a:p>
-            <a:p>
-              <a:pPr marL="171450" lvl="2" indent="-171450" defTabSz="488950">
-                <a:lnSpc>
-                  <a:spcPct val="90000"/>
-                </a:lnSpc>
-                <a:spcBef>
-                  <a:spcPct val="0"/>
-                </a:spcBef>
-                <a:spcAft>
-                  <a:spcPct val="15000"/>
-                </a:spcAft>
-                <a:buFont typeface="Arial" panose="020B0604020202020204" pitchFamily="34" charset="0"/>
-                <a:buChar char="•"/>
-              </a:pPr>
-              <a:r>
-                <a:rPr lang="en-GB" sz="1100" kern="1200" dirty="0"/>
-                <a:t>Finding correlations between variables</a:t>
+                <a:t>Dataset Description</a:t>
               </a:r>
             </a:p>
             <a:p>
@@ -4783,22 +4749,8 @@
               </a:pPr>
               <a:r>
                 <a:rPr lang="en-GB" sz="1100" kern="1200" dirty="0"/>
-                <a:t>Formulating new questions</a:t>
+                <a:t>General Planning</a:t>
               </a:r>
-            </a:p>
-            <a:p>
-              <a:pPr lvl="2" defTabSz="488950">
-                <a:lnSpc>
-                  <a:spcPct val="90000"/>
-                </a:lnSpc>
-                <a:spcBef>
-                  <a:spcPct val="0"/>
-                </a:spcBef>
-                <a:spcAft>
-                  <a:spcPct val="15000"/>
-                </a:spcAft>
-              </a:pPr>
-              <a:endParaRPr lang="en-GB" sz="1100" kern="1200" dirty="0"/>
             </a:p>
           </p:txBody>
         </p:sp>
@@ -4929,7 +4881,7 @@
               </a:pPr>
               <a:r>
                 <a:rPr lang="en-GB" kern="1200" dirty="0"/>
-                <a:t>Data Wrangling and EDA</a:t>
+                <a:t>Client Meeting</a:t>
               </a:r>
             </a:p>
           </p:txBody>
@@ -5078,7 +5030,45 @@
               </a:pPr>
               <a:r>
                 <a:rPr lang="en-GB" sz="1100" kern="1200" dirty="0"/>
-                <a:t>Went through all of the research papers which are mainly based on Machine Learning and Statistical Modelling Techniques</a:t>
+                <a:t>Task division for proposal</a:t>
+              </a:r>
+            </a:p>
+            <a:p>
+              <a:pPr marL="171450" lvl="1" indent="-171450" algn="l" defTabSz="488950">
+                <a:lnSpc>
+                  <a:spcPct val="90000"/>
+                </a:lnSpc>
+                <a:spcBef>
+                  <a:spcPct val="0"/>
+                </a:spcBef>
+                <a:spcAft>
+                  <a:spcPct val="15000"/>
+                </a:spcAft>
+                <a:buFont typeface="Arial" panose="020B0604020202020204" pitchFamily="34" charset="0"/>
+                <a:buChar char="•"/>
+              </a:pPr>
+              <a:r>
+                <a:rPr lang="en-GB" sz="1100" kern="1200" dirty="0"/>
+                <a:t>Proposal review and re-iteration</a:t>
+              </a:r>
+            </a:p>
+            <a:p>
+              <a:pPr marL="171450" lvl="1" indent="-171450" algn="l" defTabSz="488950">
+                <a:lnSpc>
+                  <a:spcPct val="90000"/>
+                </a:lnSpc>
+                <a:spcBef>
+                  <a:spcPct val="0"/>
+                </a:spcBef>
+                <a:spcAft>
+                  <a:spcPct val="15000"/>
+                </a:spcAft>
+                <a:buFont typeface="Arial" panose="020B0604020202020204" pitchFamily="34" charset="0"/>
+                <a:buChar char="•"/>
+              </a:pPr>
+              <a:r>
+                <a:rPr lang="en-GB" sz="1100" kern="1200" dirty="0"/>
+                <a:t>Shared proposal with the client</a:t>
               </a:r>
             </a:p>
           </p:txBody>
@@ -5203,7 +5193,7 @@
                     <a:srgbClr val="FFFFFF"/>
                   </a:solidFill>
                 </a:rPr>
-                <a:t>Research Papers</a:t>
+                <a:t>Proposal</a:t>
               </a:r>
               <a:endParaRPr lang="en-GB" dirty="0"/>
             </a:p>
@@ -5353,7 +5343,7 @@
               </a:pPr>
               <a:r>
                 <a:rPr lang="en-GB" sz="1100" dirty="0"/>
-                <a:t>Only 4 datasets (3 predictors)</a:t>
+                <a:t>Went through the research papers shared across by the clients (WIP)</a:t>
               </a:r>
             </a:p>
             <a:p>
@@ -5370,10 +5360,7 @@
                 <a:buFont typeface="Arial" panose="020B0604020202020204" pitchFamily="34" charset="0"/>
                 <a:buChar char="•"/>
               </a:pPr>
-              <a:r>
-                <a:rPr lang="en-GB" sz="1100" kern="1200" dirty="0"/>
-                <a:t>Merging updated datasets</a:t>
-              </a:r>
+              <a:endParaRPr lang="en-GB" sz="1100" kern="1200" dirty="0"/>
             </a:p>
           </p:txBody>
         </p:sp>
@@ -5493,7 +5480,7 @@
               <a:pPr lvl="0" algn="ctr"/>
               <a:r>
                 <a:rPr lang="en-GB" dirty="0"/>
-                <a:t>Updated Dataset</a:t>
+                <a:t>Research Papers</a:t>
               </a:r>
             </a:p>
           </p:txBody>
@@ -5676,7 +5663,7 @@
               <a:pPr lvl="0" algn="ctr"/>
               <a:r>
                 <a:rPr lang="en-GB" dirty="0"/>
-                <a:t>Client Meeting</a:t>
+                <a:t>Dataset</a:t>
               </a:r>
             </a:p>
           </p:txBody>
@@ -5825,7 +5812,7 @@
               </a:pPr>
               <a:r>
                 <a:rPr lang="en-GB" sz="1100" kern="1200" dirty="0"/>
-                <a:t>Getting our questions answered</a:t>
+                <a:t>Obtained the dataset via SFTP server</a:t>
               </a:r>
             </a:p>
             <a:p>
@@ -5844,7 +5831,7 @@
               </a:pPr>
               <a:r>
                 <a:rPr lang="en-GB" sz="1100" kern="1200" dirty="0"/>
-                <a:t>Newer simplified dataset provided by the partner</a:t>
+                <a:t>Dataset deep-dive (WIP)</a:t>
               </a:r>
             </a:p>
             <a:p>
@@ -5863,7 +5850,7 @@
               </a:pPr>
               <a:r>
                 <a:rPr lang="en-GB" sz="1100" kern="1200" dirty="0"/>
-                <a:t>Put forward new plan for client meetings &amp; communication</a:t>
+                <a:t>Prepared questions to clear our understanding</a:t>
               </a:r>
             </a:p>
           </p:txBody>
@@ -6140,7 +6127,7 @@
               </a:pPr>
               <a:r>
                 <a:rPr lang="en-GB" sz="1100" kern="1200" dirty="0"/>
-                <a:t>One of the 4 datasets presents a tough challenge to merge due to the way it is laid out</a:t>
+                <a:t>Need better understanding of data and the involved terminologies</a:t>
               </a:r>
             </a:p>
           </p:txBody>
@@ -6272,7 +6259,7 @@
               </a:pPr>
               <a:r>
                 <a:rPr lang="en-GB" kern="1200" dirty="0"/>
-                <a:t>Merging datasets</a:t>
+                <a:t>Dataset</a:t>
               </a:r>
             </a:p>
           </p:txBody>
@@ -6421,7 +6408,7 @@
               </a:pPr>
               <a:r>
                 <a:rPr lang="en-GB" sz="1100" kern="1200" dirty="0"/>
-                <a:t>We haven’t encountered this yet during initial data wrangling, but it might be a possibility while performing ML modelling</a:t>
+                <a:t>Require an optimal platform to work with the dataset as the dataset size is huge and we have multiple files</a:t>
               </a:r>
             </a:p>
           </p:txBody>
@@ -6879,7 +6866,7 @@
               </a:pPr>
               <a:r>
                 <a:rPr lang="en-GB" sz="1100" kern="1200" dirty="0"/>
-                <a:t>Though we have established new communication paradigms with client, but it’s still not efficient. </a:t>
+                <a:t>Need a better way to communicate with the client</a:t>
               </a:r>
             </a:p>
           </p:txBody>
@@ -6947,999 +6934,6 @@
 </file>
 
 <file path=ppt/slides/slide5.xml><?xml version="1.0" encoding="utf-8"?>
-<p:sld xmlns:a="http://schemas.openxmlformats.org/drawingml/2006/main" xmlns:r="http://schemas.openxmlformats.org/officeDocument/2006/relationships" xmlns:p="http://schemas.openxmlformats.org/presentationml/2006/main">
-  <p:cSld>
-    <p:spTree>
-      <p:nvGrpSpPr>
-        <p:cNvPr id="1" name=""/>
-        <p:cNvGrpSpPr/>
-        <p:nvPr/>
-      </p:nvGrpSpPr>
-      <p:grpSpPr>
-        <a:xfrm>
-          <a:off x="0" y="0"/>
-          <a:ext cx="0" cy="0"/>
-          <a:chOff x="0" y="0"/>
-          <a:chExt cx="0" cy="0"/>
-        </a:xfrm>
-      </p:grpSpPr>
-      <p:sp>
-        <p:nvSpPr>
-          <p:cNvPr id="2" name="Title 1">
-            <a:extLst>
-              <a:ext uri="{FF2B5EF4-FFF2-40B4-BE49-F238E27FC236}">
-                <a16:creationId xmlns:a16="http://schemas.microsoft.com/office/drawing/2014/main" id="{A7A094AE-1DD8-77A1-8593-304A8FE15ED2}"/>
-              </a:ext>
-            </a:extLst>
-          </p:cNvPr>
-          <p:cNvSpPr>
-            <a:spLocks noGrp="1"/>
-          </p:cNvSpPr>
-          <p:nvPr>
-            <p:ph type="title"/>
-          </p:nvPr>
-        </p:nvSpPr>
-        <p:spPr>
-          <a:xfrm>
-            <a:off x="1057898" y="549648"/>
-            <a:ext cx="6858000" cy="345000"/>
-          </a:xfrm>
-        </p:spPr>
-        <p:txBody>
-          <a:bodyPr/>
-          <a:lstStyle/>
-          <a:p>
-            <a:r>
-              <a:rPr lang="en" b="1" dirty="0">
-                <a:solidFill>
-                  <a:srgbClr val="39C0BA"/>
-                </a:solidFill>
-              </a:rPr>
-              <a:t>Team Log for the week</a:t>
-            </a:r>
-            <a:endParaRPr lang="en-US" dirty="0"/>
-          </a:p>
-        </p:txBody>
-      </p:sp>
-      <p:sp>
-        <p:nvSpPr>
-          <p:cNvPr id="3" name="Text Placeholder 2">
-            <a:extLst>
-              <a:ext uri="{FF2B5EF4-FFF2-40B4-BE49-F238E27FC236}">
-                <a16:creationId xmlns:a16="http://schemas.microsoft.com/office/drawing/2014/main" id="{234FE816-FBE1-52A7-2967-E2A607DA0B7A}"/>
-              </a:ext>
-            </a:extLst>
-          </p:cNvPr>
-          <p:cNvSpPr>
-            <a:spLocks noGrp="1"/>
-          </p:cNvSpPr>
-          <p:nvPr>
-            <p:ph type="body" idx="1"/>
-          </p:nvPr>
-        </p:nvSpPr>
-        <p:spPr/>
-        <p:txBody>
-          <a:bodyPr/>
-          <a:lstStyle/>
-          <a:p>
-            <a:pPr marL="38100" indent="0">
-              <a:buNone/>
-            </a:pPr>
-            <a:endParaRPr lang="en-US" dirty="0"/>
-          </a:p>
-        </p:txBody>
-      </p:sp>
-      <p:sp>
-        <p:nvSpPr>
-          <p:cNvPr id="4" name="Slide Number Placeholder 3">
-            <a:extLst>
-              <a:ext uri="{FF2B5EF4-FFF2-40B4-BE49-F238E27FC236}">
-                <a16:creationId xmlns:a16="http://schemas.microsoft.com/office/drawing/2014/main" id="{CC4AA5F1-C730-1941-6A83-C3F41FC397D2}"/>
-              </a:ext>
-            </a:extLst>
-          </p:cNvPr>
-          <p:cNvSpPr>
-            <a:spLocks noGrp="1"/>
-          </p:cNvSpPr>
-          <p:nvPr>
-            <p:ph type="sldNum" idx="12"/>
-          </p:nvPr>
-        </p:nvSpPr>
-        <p:spPr/>
-        <p:txBody>
-          <a:bodyPr/>
-          <a:lstStyle/>
-          <a:p>
-            <a:pPr marL="0" lvl="0" indent="0" algn="r" rtl="0">
-              <a:spcBef>
-                <a:spcPts val="0"/>
-              </a:spcBef>
-              <a:spcAft>
-                <a:spcPts val="0"/>
-              </a:spcAft>
-              <a:buNone/>
-            </a:pPr>
-            <a:fld id="{00000000-1234-1234-1234-123412341234}" type="slidenum">
-              <a:rPr lang="en" smtClean="0"/>
-              <a:t>5</a:t>
-            </a:fld>
-            <a:endParaRPr lang="en"/>
-          </a:p>
-        </p:txBody>
-      </p:sp>
-      <p:graphicFrame>
-        <p:nvGraphicFramePr>
-          <p:cNvPr id="7" name="Table 7">
-            <a:extLst>
-              <a:ext uri="{FF2B5EF4-FFF2-40B4-BE49-F238E27FC236}">
-                <a16:creationId xmlns:a16="http://schemas.microsoft.com/office/drawing/2014/main" id="{675C09A4-3788-4CB0-9E3E-5504A7F02677}"/>
-              </a:ext>
-            </a:extLst>
-          </p:cNvPr>
-          <p:cNvGraphicFramePr>
-            <a:graphicFrameLocks noGrp="1"/>
-          </p:cNvGraphicFramePr>
-          <p:nvPr>
-            <p:extLst>
-              <p:ext uri="{D42A27DB-BD31-4B8C-83A1-F6EECF244321}">
-                <p14:modId xmlns:p14="http://schemas.microsoft.com/office/powerpoint/2010/main" val="2055617658"/>
-              </p:ext>
-            </p:extLst>
-          </p:nvPr>
-        </p:nvGraphicFramePr>
-        <p:xfrm>
-          <a:off x="1169894" y="894649"/>
-          <a:ext cx="6945406" cy="3917852"/>
-        </p:xfrm>
-        <a:graphic>
-          <a:graphicData uri="http://schemas.openxmlformats.org/drawingml/2006/table">
-            <a:tbl>
-              <a:tblPr firstRow="1" bandRow="1">
-                <a:tableStyleId>{3C2FFA5D-87B4-456A-9821-1D502468CF0F}</a:tableStyleId>
-              </a:tblPr>
-              <a:tblGrid>
-                <a:gridCol w="4686300">
-                  <a:extLst>
-                    <a:ext uri="{9D8B030D-6E8A-4147-A177-3AD203B41FA5}">
-                      <a16:colId xmlns:a16="http://schemas.microsoft.com/office/drawing/2014/main" val="2493429949"/>
-                    </a:ext>
-                  </a:extLst>
-                </a:gridCol>
-                <a:gridCol w="2259106">
-                  <a:extLst>
-                    <a:ext uri="{9D8B030D-6E8A-4147-A177-3AD203B41FA5}">
-                      <a16:colId xmlns:a16="http://schemas.microsoft.com/office/drawing/2014/main" val="1457667999"/>
-                    </a:ext>
-                  </a:extLst>
-                </a:gridCol>
-              </a:tblGrid>
-              <a:tr h="325559">
-                <a:tc>
-                  <a:txBody>
-                    <a:bodyPr/>
-                    <a:lstStyle/>
-                    <a:p>
-                      <a:r>
-                        <a:rPr lang="en-IN" dirty="0"/>
-                        <a:t>Activities/Tasks</a:t>
-                      </a:r>
-                    </a:p>
-                  </a:txBody>
-                  <a:tcPr>
-                    <a:lnL w="12700" cap="flat" cmpd="sng" algn="ctr">
-                      <a:solidFill>
-                        <a:schemeClr val="tx1"/>
-                      </a:solidFill>
-                      <a:prstDash val="solid"/>
-                      <a:round/>
-                      <a:headEnd type="none" w="med" len="med"/>
-                      <a:tailEnd type="none" w="med" len="med"/>
-                    </a:lnL>
-                    <a:lnR w="12700" cap="flat" cmpd="sng" algn="ctr">
-                      <a:solidFill>
-                        <a:schemeClr val="tx1"/>
-                      </a:solidFill>
-                      <a:prstDash val="solid"/>
-                      <a:round/>
-                      <a:headEnd type="none" w="med" len="med"/>
-                      <a:tailEnd type="none" w="med" len="med"/>
-                    </a:lnR>
-                    <a:lnT w="12700" cap="flat" cmpd="sng" algn="ctr">
-                      <a:solidFill>
-                        <a:schemeClr val="tx1"/>
-                      </a:solidFill>
-                      <a:prstDash val="solid"/>
-                      <a:round/>
-                      <a:headEnd type="none" w="med" len="med"/>
-                      <a:tailEnd type="none" w="med" len="med"/>
-                    </a:lnT>
-                    <a:lnB w="12700" cap="flat" cmpd="sng" algn="ctr">
-                      <a:solidFill>
-                        <a:schemeClr val="tx1"/>
-                      </a:solidFill>
-                      <a:prstDash val="solid"/>
-                      <a:round/>
-                      <a:headEnd type="none" w="med" len="med"/>
-                      <a:tailEnd type="none" w="med" len="med"/>
-                    </a:lnB>
-                  </a:tcPr>
-                </a:tc>
-                <a:tc>
-                  <a:txBody>
-                    <a:bodyPr/>
-                    <a:lstStyle/>
-                    <a:p>
-                      <a:r>
-                        <a:rPr lang="en-IN" dirty="0"/>
-                        <a:t>Hours</a:t>
-                      </a:r>
-                    </a:p>
-                  </a:txBody>
-                  <a:tcPr>
-                    <a:lnL w="12700" cap="flat" cmpd="sng" algn="ctr">
-                      <a:solidFill>
-                        <a:schemeClr val="tx1"/>
-                      </a:solidFill>
-                      <a:prstDash val="solid"/>
-                      <a:round/>
-                      <a:headEnd type="none" w="med" len="med"/>
-                      <a:tailEnd type="none" w="med" len="med"/>
-                    </a:lnL>
-                    <a:lnR w="12700" cap="flat" cmpd="sng" algn="ctr">
-                      <a:solidFill>
-                        <a:schemeClr val="tx1"/>
-                      </a:solidFill>
-                      <a:prstDash val="solid"/>
-                      <a:round/>
-                      <a:headEnd type="none" w="med" len="med"/>
-                      <a:tailEnd type="none" w="med" len="med"/>
-                    </a:lnR>
-                    <a:lnT w="12700" cap="flat" cmpd="sng" algn="ctr">
-                      <a:solidFill>
-                        <a:schemeClr val="tx1"/>
-                      </a:solidFill>
-                      <a:prstDash val="solid"/>
-                      <a:round/>
-                      <a:headEnd type="none" w="med" len="med"/>
-                      <a:tailEnd type="none" w="med" len="med"/>
-                    </a:lnT>
-                    <a:lnB w="12700" cap="flat" cmpd="sng" algn="ctr">
-                      <a:solidFill>
-                        <a:schemeClr val="tx1"/>
-                      </a:solidFill>
-                      <a:prstDash val="solid"/>
-                      <a:round/>
-                      <a:headEnd type="none" w="med" len="med"/>
-                      <a:tailEnd type="none" w="med" len="med"/>
-                    </a:lnB>
-                  </a:tcPr>
-                </a:tc>
-                <a:extLst>
-                  <a:ext uri="{0D108BD9-81ED-4DB2-BD59-A6C34878D82A}">
-                    <a16:rowId xmlns:a16="http://schemas.microsoft.com/office/drawing/2014/main" val="435316825"/>
-                  </a:ext>
-                </a:extLst>
-              </a:tr>
-              <a:tr h="553451">
-                <a:tc>
-                  <a:txBody>
-                    <a:bodyPr/>
-                    <a:lstStyle/>
-                    <a:p>
-                      <a:r>
-                        <a:rPr lang="en-IN" dirty="0"/>
-                        <a:t>Data Wrangling and Merging datasets via Python on the first version of the Datasets provided</a:t>
-                      </a:r>
-                    </a:p>
-                  </a:txBody>
-                  <a:tcPr>
-                    <a:lnL w="12700" cap="flat" cmpd="sng" algn="ctr">
-                      <a:solidFill>
-                        <a:schemeClr val="tx1"/>
-                      </a:solidFill>
-                      <a:prstDash val="solid"/>
-                      <a:round/>
-                      <a:headEnd type="none" w="med" len="med"/>
-                      <a:tailEnd type="none" w="med" len="med"/>
-                    </a:lnL>
-                    <a:lnR w="12700" cap="flat" cmpd="sng" algn="ctr">
-                      <a:solidFill>
-                        <a:schemeClr val="tx1"/>
-                      </a:solidFill>
-                      <a:prstDash val="solid"/>
-                      <a:round/>
-                      <a:headEnd type="none" w="med" len="med"/>
-                      <a:tailEnd type="none" w="med" len="med"/>
-                    </a:lnR>
-                    <a:lnT w="12700" cap="flat" cmpd="sng" algn="ctr">
-                      <a:solidFill>
-                        <a:schemeClr val="tx1"/>
-                      </a:solidFill>
-                      <a:prstDash val="solid"/>
-                      <a:round/>
-                      <a:headEnd type="none" w="med" len="med"/>
-                      <a:tailEnd type="none" w="med" len="med"/>
-                    </a:lnT>
-                    <a:lnB w="12700" cap="flat" cmpd="sng" algn="ctr">
-                      <a:solidFill>
-                        <a:schemeClr val="tx1"/>
-                      </a:solidFill>
-                      <a:prstDash val="solid"/>
-                      <a:round/>
-                      <a:headEnd type="none" w="med" len="med"/>
-                      <a:tailEnd type="none" w="med" len="med"/>
-                    </a:lnB>
-                  </a:tcPr>
-                </a:tc>
-                <a:tc>
-                  <a:txBody>
-                    <a:bodyPr/>
-                    <a:lstStyle/>
-                    <a:p>
-                      <a:r>
-                        <a:rPr lang="en-IN" dirty="0"/>
-                        <a:t>6</a:t>
-                      </a:r>
-                    </a:p>
-                  </a:txBody>
-                  <a:tcPr>
-                    <a:lnL w="12700" cap="flat" cmpd="sng" algn="ctr">
-                      <a:solidFill>
-                        <a:schemeClr val="tx1"/>
-                      </a:solidFill>
-                      <a:prstDash val="solid"/>
-                      <a:round/>
-                      <a:headEnd type="none" w="med" len="med"/>
-                      <a:tailEnd type="none" w="med" len="med"/>
-                    </a:lnL>
-                    <a:lnR w="12700" cap="flat" cmpd="sng" algn="ctr">
-                      <a:solidFill>
-                        <a:schemeClr val="tx1"/>
-                      </a:solidFill>
-                      <a:prstDash val="solid"/>
-                      <a:round/>
-                      <a:headEnd type="none" w="med" len="med"/>
-                      <a:tailEnd type="none" w="med" len="med"/>
-                    </a:lnR>
-                    <a:lnT w="12700" cap="flat" cmpd="sng" algn="ctr">
-                      <a:solidFill>
-                        <a:schemeClr val="tx1"/>
-                      </a:solidFill>
-                      <a:prstDash val="solid"/>
-                      <a:round/>
-                      <a:headEnd type="none" w="med" len="med"/>
-                      <a:tailEnd type="none" w="med" len="med"/>
-                    </a:lnT>
-                    <a:lnB w="12700" cap="flat" cmpd="sng" algn="ctr">
-                      <a:solidFill>
-                        <a:schemeClr val="tx1"/>
-                      </a:solidFill>
-                      <a:prstDash val="solid"/>
-                      <a:round/>
-                      <a:headEnd type="none" w="med" len="med"/>
-                      <a:tailEnd type="none" w="med" len="med"/>
-                    </a:lnB>
-                  </a:tcPr>
-                </a:tc>
-                <a:extLst>
-                  <a:ext uri="{0D108BD9-81ED-4DB2-BD59-A6C34878D82A}">
-                    <a16:rowId xmlns:a16="http://schemas.microsoft.com/office/drawing/2014/main" val="869189533"/>
-                  </a:ext>
-                </a:extLst>
-              </a:tr>
-              <a:tr h="553451">
-                <a:tc>
-                  <a:txBody>
-                    <a:bodyPr/>
-                    <a:lstStyle/>
-                    <a:p>
-                      <a:r>
-                        <a:rPr lang="en-IN" dirty="0"/>
-                        <a:t>Performing Exploring Data Analysis and finding correlation between some of the predictors using plots</a:t>
-                      </a:r>
-                    </a:p>
-                  </a:txBody>
-                  <a:tcPr>
-                    <a:lnL w="12700" cap="flat" cmpd="sng" algn="ctr">
-                      <a:solidFill>
-                        <a:schemeClr val="tx1"/>
-                      </a:solidFill>
-                      <a:prstDash val="solid"/>
-                      <a:round/>
-                      <a:headEnd type="none" w="med" len="med"/>
-                      <a:tailEnd type="none" w="med" len="med"/>
-                    </a:lnL>
-                    <a:lnR w="12700" cap="flat" cmpd="sng" algn="ctr">
-                      <a:solidFill>
-                        <a:schemeClr val="tx1"/>
-                      </a:solidFill>
-                      <a:prstDash val="solid"/>
-                      <a:round/>
-                      <a:headEnd type="none" w="med" len="med"/>
-                      <a:tailEnd type="none" w="med" len="med"/>
-                    </a:lnR>
-                    <a:lnT w="12700" cap="flat" cmpd="sng" algn="ctr">
-                      <a:solidFill>
-                        <a:schemeClr val="tx1"/>
-                      </a:solidFill>
-                      <a:prstDash val="solid"/>
-                      <a:round/>
-                      <a:headEnd type="none" w="med" len="med"/>
-                      <a:tailEnd type="none" w="med" len="med"/>
-                    </a:lnT>
-                    <a:lnB w="12700" cap="flat" cmpd="sng" algn="ctr">
-                      <a:solidFill>
-                        <a:schemeClr val="tx1"/>
-                      </a:solidFill>
-                      <a:prstDash val="solid"/>
-                      <a:round/>
-                      <a:headEnd type="none" w="med" len="med"/>
-                      <a:tailEnd type="none" w="med" len="med"/>
-                    </a:lnB>
-                  </a:tcPr>
-                </a:tc>
-                <a:tc>
-                  <a:txBody>
-                    <a:bodyPr/>
-                    <a:lstStyle/>
-                    <a:p>
-                      <a:r>
-                        <a:rPr lang="en-IN" dirty="0"/>
-                        <a:t>6</a:t>
-                      </a:r>
-                    </a:p>
-                  </a:txBody>
-                  <a:tcPr>
-                    <a:lnL w="12700" cap="flat" cmpd="sng" algn="ctr">
-                      <a:solidFill>
-                        <a:schemeClr val="tx1"/>
-                      </a:solidFill>
-                      <a:prstDash val="solid"/>
-                      <a:round/>
-                      <a:headEnd type="none" w="med" len="med"/>
-                      <a:tailEnd type="none" w="med" len="med"/>
-                    </a:lnL>
-                    <a:lnR w="12700" cap="flat" cmpd="sng" algn="ctr">
-                      <a:solidFill>
-                        <a:schemeClr val="tx1"/>
-                      </a:solidFill>
-                      <a:prstDash val="solid"/>
-                      <a:round/>
-                      <a:headEnd type="none" w="med" len="med"/>
-                      <a:tailEnd type="none" w="med" len="med"/>
-                    </a:lnR>
-                    <a:lnT w="12700" cap="flat" cmpd="sng" algn="ctr">
-                      <a:solidFill>
-                        <a:schemeClr val="tx1"/>
-                      </a:solidFill>
-                      <a:prstDash val="solid"/>
-                      <a:round/>
-                      <a:headEnd type="none" w="med" len="med"/>
-                      <a:tailEnd type="none" w="med" len="med"/>
-                    </a:lnT>
-                    <a:lnB w="12700" cap="flat" cmpd="sng" algn="ctr">
-                      <a:solidFill>
-                        <a:schemeClr val="tx1"/>
-                      </a:solidFill>
-                      <a:prstDash val="solid"/>
-                      <a:round/>
-                      <a:headEnd type="none" w="med" len="med"/>
-                      <a:tailEnd type="none" w="med" len="med"/>
-                    </a:lnB>
-                  </a:tcPr>
-                </a:tc>
-                <a:extLst>
-                  <a:ext uri="{0D108BD9-81ED-4DB2-BD59-A6C34878D82A}">
-                    <a16:rowId xmlns:a16="http://schemas.microsoft.com/office/drawing/2014/main" val="1943656700"/>
-                  </a:ext>
-                </a:extLst>
-              </a:tr>
-              <a:tr h="575299">
-                <a:tc>
-                  <a:txBody>
-                    <a:bodyPr/>
-                    <a:lstStyle/>
-                    <a:p>
-                      <a:r>
-                        <a:rPr lang="en-IN" dirty="0"/>
-                        <a:t>Coming up with more questions with the customer based on the Analysis done on the existing dataset</a:t>
-                      </a:r>
-                    </a:p>
-                  </a:txBody>
-                  <a:tcPr>
-                    <a:lnL w="12700" cap="flat" cmpd="sng" algn="ctr">
-                      <a:solidFill>
-                        <a:schemeClr val="tx1"/>
-                      </a:solidFill>
-                      <a:prstDash val="solid"/>
-                      <a:round/>
-                      <a:headEnd type="none" w="med" len="med"/>
-                      <a:tailEnd type="none" w="med" len="med"/>
-                    </a:lnL>
-                    <a:lnR w="12700" cap="flat" cmpd="sng" algn="ctr">
-                      <a:solidFill>
-                        <a:schemeClr val="tx1"/>
-                      </a:solidFill>
-                      <a:prstDash val="solid"/>
-                      <a:round/>
-                      <a:headEnd type="none" w="med" len="med"/>
-                      <a:tailEnd type="none" w="med" len="med"/>
-                    </a:lnR>
-                    <a:lnT w="12700" cap="flat" cmpd="sng" algn="ctr">
-                      <a:solidFill>
-                        <a:schemeClr val="tx1"/>
-                      </a:solidFill>
-                      <a:prstDash val="solid"/>
-                      <a:round/>
-                      <a:headEnd type="none" w="med" len="med"/>
-                      <a:tailEnd type="none" w="med" len="med"/>
-                    </a:lnT>
-                    <a:lnB w="12700" cap="flat" cmpd="sng" algn="ctr">
-                      <a:solidFill>
-                        <a:schemeClr val="tx1"/>
-                      </a:solidFill>
-                      <a:prstDash val="solid"/>
-                      <a:round/>
-                      <a:headEnd type="none" w="med" len="med"/>
-                      <a:tailEnd type="none" w="med" len="med"/>
-                    </a:lnB>
-                  </a:tcPr>
-                </a:tc>
-                <a:tc>
-                  <a:txBody>
-                    <a:bodyPr/>
-                    <a:lstStyle/>
-                    <a:p>
-                      <a:r>
-                        <a:rPr lang="en-IN" dirty="0"/>
-                        <a:t>4</a:t>
-                      </a:r>
-                    </a:p>
-                  </a:txBody>
-                  <a:tcPr>
-                    <a:lnL w="12700" cap="flat" cmpd="sng" algn="ctr">
-                      <a:solidFill>
-                        <a:schemeClr val="tx1"/>
-                      </a:solidFill>
-                      <a:prstDash val="solid"/>
-                      <a:round/>
-                      <a:headEnd type="none" w="med" len="med"/>
-                      <a:tailEnd type="none" w="med" len="med"/>
-                    </a:lnL>
-                    <a:lnR w="12700" cap="flat" cmpd="sng" algn="ctr">
-                      <a:solidFill>
-                        <a:schemeClr val="tx1"/>
-                      </a:solidFill>
-                      <a:prstDash val="solid"/>
-                      <a:round/>
-                      <a:headEnd type="none" w="med" len="med"/>
-                      <a:tailEnd type="none" w="med" len="med"/>
-                    </a:lnR>
-                    <a:lnT w="12700" cap="flat" cmpd="sng" algn="ctr">
-                      <a:solidFill>
-                        <a:schemeClr val="tx1"/>
-                      </a:solidFill>
-                      <a:prstDash val="solid"/>
-                      <a:round/>
-                      <a:headEnd type="none" w="med" len="med"/>
-                      <a:tailEnd type="none" w="med" len="med"/>
-                    </a:lnT>
-                    <a:lnB w="12700" cap="flat" cmpd="sng" algn="ctr">
-                      <a:solidFill>
-                        <a:schemeClr val="tx1"/>
-                      </a:solidFill>
-                      <a:prstDash val="solid"/>
-                      <a:round/>
-                      <a:headEnd type="none" w="med" len="med"/>
-                      <a:tailEnd type="none" w="med" len="med"/>
-                    </a:lnB>
-                  </a:tcPr>
-                </a:tc>
-                <a:extLst>
-                  <a:ext uri="{0D108BD9-81ED-4DB2-BD59-A6C34878D82A}">
-                    <a16:rowId xmlns:a16="http://schemas.microsoft.com/office/drawing/2014/main" val="2995035234"/>
-                  </a:ext>
-                </a:extLst>
-              </a:tr>
-              <a:tr h="553451">
-                <a:tc>
-                  <a:txBody>
-                    <a:bodyPr/>
-                    <a:lstStyle/>
-                    <a:p>
-                      <a:r>
-                        <a:rPr lang="en-IN" dirty="0"/>
-                        <a:t>Reading through all the relevant research papers relevant to the project</a:t>
-                      </a:r>
-                    </a:p>
-                  </a:txBody>
-                  <a:tcPr>
-                    <a:lnL w="12700" cap="flat" cmpd="sng" algn="ctr">
-                      <a:solidFill>
-                        <a:schemeClr val="tx1"/>
-                      </a:solidFill>
-                      <a:prstDash val="solid"/>
-                      <a:round/>
-                      <a:headEnd type="none" w="med" len="med"/>
-                      <a:tailEnd type="none" w="med" len="med"/>
-                    </a:lnL>
-                    <a:lnR w="12700" cap="flat" cmpd="sng" algn="ctr">
-                      <a:solidFill>
-                        <a:schemeClr val="tx1"/>
-                      </a:solidFill>
-                      <a:prstDash val="solid"/>
-                      <a:round/>
-                      <a:headEnd type="none" w="med" len="med"/>
-                      <a:tailEnd type="none" w="med" len="med"/>
-                    </a:lnR>
-                    <a:lnT w="12700" cap="flat" cmpd="sng" algn="ctr">
-                      <a:solidFill>
-                        <a:schemeClr val="tx1"/>
-                      </a:solidFill>
-                      <a:prstDash val="solid"/>
-                      <a:round/>
-                      <a:headEnd type="none" w="med" len="med"/>
-                      <a:tailEnd type="none" w="med" len="med"/>
-                    </a:lnT>
-                    <a:lnB w="12700" cap="flat" cmpd="sng" algn="ctr">
-                      <a:solidFill>
-                        <a:schemeClr val="tx1"/>
-                      </a:solidFill>
-                      <a:prstDash val="solid"/>
-                      <a:round/>
-                      <a:headEnd type="none" w="med" len="med"/>
-                      <a:tailEnd type="none" w="med" len="med"/>
-                    </a:lnB>
-                  </a:tcPr>
-                </a:tc>
-                <a:tc>
-                  <a:txBody>
-                    <a:bodyPr/>
-                    <a:lstStyle/>
-                    <a:p>
-                      <a:r>
-                        <a:rPr lang="en-IN" dirty="0"/>
-                        <a:t>5</a:t>
-                      </a:r>
-                    </a:p>
-                  </a:txBody>
-                  <a:tcPr>
-                    <a:lnL w="12700" cap="flat" cmpd="sng" algn="ctr">
-                      <a:solidFill>
-                        <a:schemeClr val="tx1"/>
-                      </a:solidFill>
-                      <a:prstDash val="solid"/>
-                      <a:round/>
-                      <a:headEnd type="none" w="med" len="med"/>
-                      <a:tailEnd type="none" w="med" len="med"/>
-                    </a:lnL>
-                    <a:lnR w="12700" cap="flat" cmpd="sng" algn="ctr">
-                      <a:solidFill>
-                        <a:schemeClr val="tx1"/>
-                      </a:solidFill>
-                      <a:prstDash val="solid"/>
-                      <a:round/>
-                      <a:headEnd type="none" w="med" len="med"/>
-                      <a:tailEnd type="none" w="med" len="med"/>
-                    </a:lnR>
-                    <a:lnT w="12700" cap="flat" cmpd="sng" algn="ctr">
-                      <a:solidFill>
-                        <a:schemeClr val="tx1"/>
-                      </a:solidFill>
-                      <a:prstDash val="solid"/>
-                      <a:round/>
-                      <a:headEnd type="none" w="med" len="med"/>
-                      <a:tailEnd type="none" w="med" len="med"/>
-                    </a:lnT>
-                    <a:lnB w="12700" cap="flat" cmpd="sng" algn="ctr">
-                      <a:solidFill>
-                        <a:schemeClr val="tx1"/>
-                      </a:solidFill>
-                      <a:prstDash val="solid"/>
-                      <a:round/>
-                      <a:headEnd type="none" w="med" len="med"/>
-                      <a:tailEnd type="none" w="med" len="med"/>
-                    </a:lnB>
-                  </a:tcPr>
-                </a:tc>
-                <a:extLst>
-                  <a:ext uri="{0D108BD9-81ED-4DB2-BD59-A6C34878D82A}">
-                    <a16:rowId xmlns:a16="http://schemas.microsoft.com/office/drawing/2014/main" val="285992144"/>
-                  </a:ext>
-                </a:extLst>
-              </a:tr>
-              <a:tr h="575299">
-                <a:tc>
-                  <a:txBody>
-                    <a:bodyPr/>
-                    <a:lstStyle/>
-                    <a:p>
-                      <a:pPr marL="0" marR="0" lvl="0" indent="0" algn="l" defTabSz="914400" rtl="0" eaLnBrk="1" fontAlgn="auto" latinLnBrk="0" hangingPunct="1">
-                        <a:lnSpc>
-                          <a:spcPct val="100000"/>
-                        </a:lnSpc>
-                        <a:spcBef>
-                          <a:spcPts val="0"/>
-                        </a:spcBef>
-                        <a:spcAft>
-                          <a:spcPts val="0"/>
-                        </a:spcAft>
-                        <a:buClr>
-                          <a:srgbClr val="000000"/>
-                        </a:buClr>
-                        <a:buSzTx/>
-                        <a:buFont typeface="Arial"/>
-                        <a:buNone/>
-                        <a:tabLst/>
-                        <a:defRPr/>
-                      </a:pPr>
-                      <a:r>
-                        <a:rPr lang="en-IN" dirty="0"/>
-                        <a:t>Client Call discussing all the queries regarding the data</a:t>
-                      </a:r>
-                    </a:p>
-                  </a:txBody>
-                  <a:tcPr>
-                    <a:lnL w="12700" cap="flat" cmpd="sng" algn="ctr">
-                      <a:solidFill>
-                        <a:schemeClr val="tx1"/>
-                      </a:solidFill>
-                      <a:prstDash val="solid"/>
-                      <a:round/>
-                      <a:headEnd type="none" w="med" len="med"/>
-                      <a:tailEnd type="none" w="med" len="med"/>
-                    </a:lnL>
-                    <a:lnR w="12700" cap="flat" cmpd="sng" algn="ctr">
-                      <a:solidFill>
-                        <a:schemeClr val="tx1"/>
-                      </a:solidFill>
-                      <a:prstDash val="solid"/>
-                      <a:round/>
-                      <a:headEnd type="none" w="med" len="med"/>
-                      <a:tailEnd type="none" w="med" len="med"/>
-                    </a:lnR>
-                    <a:lnT w="12700" cap="flat" cmpd="sng" algn="ctr">
-                      <a:solidFill>
-                        <a:schemeClr val="tx1"/>
-                      </a:solidFill>
-                      <a:prstDash val="solid"/>
-                      <a:round/>
-                      <a:headEnd type="none" w="med" len="med"/>
-                      <a:tailEnd type="none" w="med" len="med"/>
-                    </a:lnT>
-                    <a:lnB w="12700" cap="flat" cmpd="sng" algn="ctr">
-                      <a:solidFill>
-                        <a:schemeClr val="tx1"/>
-                      </a:solidFill>
-                      <a:prstDash val="solid"/>
-                      <a:round/>
-                      <a:headEnd type="none" w="med" len="med"/>
-                      <a:tailEnd type="none" w="med" len="med"/>
-                    </a:lnB>
-                  </a:tcPr>
-                </a:tc>
-                <a:tc>
-                  <a:txBody>
-                    <a:bodyPr/>
-                    <a:lstStyle/>
-                    <a:p>
-                      <a:r>
-                        <a:rPr lang="en-IN" dirty="0"/>
-                        <a:t>2</a:t>
-                      </a:r>
-                    </a:p>
-                  </a:txBody>
-                  <a:tcPr>
-                    <a:lnL w="12700" cap="flat" cmpd="sng" algn="ctr">
-                      <a:solidFill>
-                        <a:schemeClr val="tx1"/>
-                      </a:solidFill>
-                      <a:prstDash val="solid"/>
-                      <a:round/>
-                      <a:headEnd type="none" w="med" len="med"/>
-                      <a:tailEnd type="none" w="med" len="med"/>
-                    </a:lnL>
-                    <a:lnR w="12700" cap="flat" cmpd="sng" algn="ctr">
-                      <a:solidFill>
-                        <a:schemeClr val="tx1"/>
-                      </a:solidFill>
-                      <a:prstDash val="solid"/>
-                      <a:round/>
-                      <a:headEnd type="none" w="med" len="med"/>
-                      <a:tailEnd type="none" w="med" len="med"/>
-                    </a:lnR>
-                    <a:lnT w="12700" cap="flat" cmpd="sng" algn="ctr">
-                      <a:solidFill>
-                        <a:schemeClr val="tx1"/>
-                      </a:solidFill>
-                      <a:prstDash val="solid"/>
-                      <a:round/>
-                      <a:headEnd type="none" w="med" len="med"/>
-                      <a:tailEnd type="none" w="med" len="med"/>
-                    </a:lnT>
-                    <a:lnB w="12700" cap="flat" cmpd="sng" algn="ctr">
-                      <a:solidFill>
-                        <a:schemeClr val="tx1"/>
-                      </a:solidFill>
-                      <a:prstDash val="solid"/>
-                      <a:round/>
-                      <a:headEnd type="none" w="med" len="med"/>
-                      <a:tailEnd type="none" w="med" len="med"/>
-                    </a:lnB>
-                  </a:tcPr>
-                </a:tc>
-                <a:extLst>
-                  <a:ext uri="{0D108BD9-81ED-4DB2-BD59-A6C34878D82A}">
-                    <a16:rowId xmlns:a16="http://schemas.microsoft.com/office/drawing/2014/main" val="3075141906"/>
-                  </a:ext>
-                </a:extLst>
-              </a:tr>
-              <a:tr h="781342">
-                <a:tc>
-                  <a:txBody>
-                    <a:bodyPr/>
-                    <a:lstStyle/>
-                    <a:p>
-                      <a:pPr marL="0" marR="0" lvl="0" indent="0" algn="l" defTabSz="914400" rtl="0" eaLnBrk="1" fontAlgn="auto" latinLnBrk="0" hangingPunct="1">
-                        <a:lnSpc>
-                          <a:spcPct val="100000"/>
-                        </a:lnSpc>
-                        <a:spcBef>
-                          <a:spcPts val="0"/>
-                        </a:spcBef>
-                        <a:spcAft>
-                          <a:spcPts val="0"/>
-                        </a:spcAft>
-                        <a:buClr>
-                          <a:srgbClr val="000000"/>
-                        </a:buClr>
-                        <a:buSzTx/>
-                        <a:buFont typeface="Arial"/>
-                        <a:buNone/>
-                        <a:tabLst/>
-                        <a:defRPr/>
-                      </a:pPr>
-                      <a:r>
-                        <a:rPr lang="en-IN" dirty="0"/>
-                        <a:t>Data Wrangling and Merging datasets via Python on the updated version of the Datasets provided</a:t>
-                      </a:r>
-                    </a:p>
-                    <a:p>
-                      <a:pPr marL="0" marR="0" lvl="0" indent="0" algn="l" defTabSz="914400" rtl="0" eaLnBrk="1" fontAlgn="auto" latinLnBrk="0" hangingPunct="1">
-                        <a:lnSpc>
-                          <a:spcPct val="100000"/>
-                        </a:lnSpc>
-                        <a:spcBef>
-                          <a:spcPts val="0"/>
-                        </a:spcBef>
-                        <a:spcAft>
-                          <a:spcPts val="0"/>
-                        </a:spcAft>
-                        <a:buClr>
-                          <a:srgbClr val="000000"/>
-                        </a:buClr>
-                        <a:buSzTx/>
-                        <a:buFont typeface="Arial"/>
-                        <a:buNone/>
-                        <a:tabLst/>
-                        <a:defRPr/>
-                      </a:pPr>
-                      <a:endParaRPr lang="en-IN" dirty="0"/>
-                    </a:p>
-                  </a:txBody>
-                  <a:tcPr>
-                    <a:lnL w="12700" cap="flat" cmpd="sng" algn="ctr">
-                      <a:solidFill>
-                        <a:schemeClr val="tx1"/>
-                      </a:solidFill>
-                      <a:prstDash val="solid"/>
-                      <a:round/>
-                      <a:headEnd type="none" w="med" len="med"/>
-                      <a:tailEnd type="none" w="med" len="med"/>
-                    </a:lnL>
-                    <a:lnR w="12700" cap="flat" cmpd="sng" algn="ctr">
-                      <a:solidFill>
-                        <a:schemeClr val="tx1"/>
-                      </a:solidFill>
-                      <a:prstDash val="solid"/>
-                      <a:round/>
-                      <a:headEnd type="none" w="med" len="med"/>
-                      <a:tailEnd type="none" w="med" len="med"/>
-                    </a:lnR>
-                    <a:lnT w="12700" cap="flat" cmpd="sng" algn="ctr">
-                      <a:solidFill>
-                        <a:schemeClr val="tx1"/>
-                      </a:solidFill>
-                      <a:prstDash val="solid"/>
-                      <a:round/>
-                      <a:headEnd type="none" w="med" len="med"/>
-                      <a:tailEnd type="none" w="med" len="med"/>
-                    </a:lnT>
-                    <a:lnB w="12700" cap="flat" cmpd="sng" algn="ctr">
-                      <a:solidFill>
-                        <a:schemeClr val="tx1"/>
-                      </a:solidFill>
-                      <a:prstDash val="solid"/>
-                      <a:round/>
-                      <a:headEnd type="none" w="med" len="med"/>
-                      <a:tailEnd type="none" w="med" len="med"/>
-                    </a:lnB>
-                  </a:tcPr>
-                </a:tc>
-                <a:tc>
-                  <a:txBody>
-                    <a:bodyPr/>
-                    <a:lstStyle/>
-                    <a:p>
-                      <a:r>
-                        <a:rPr lang="en-IN" dirty="0"/>
-                        <a:t>7</a:t>
-                      </a:r>
-                    </a:p>
-                  </a:txBody>
-                  <a:tcPr>
-                    <a:lnL w="12700" cap="flat" cmpd="sng" algn="ctr">
-                      <a:solidFill>
-                        <a:schemeClr val="tx1"/>
-                      </a:solidFill>
-                      <a:prstDash val="solid"/>
-                      <a:round/>
-                      <a:headEnd type="none" w="med" len="med"/>
-                      <a:tailEnd type="none" w="med" len="med"/>
-                    </a:lnL>
-                    <a:lnR w="12700" cap="flat" cmpd="sng" algn="ctr">
-                      <a:solidFill>
-                        <a:schemeClr val="tx1"/>
-                      </a:solidFill>
-                      <a:prstDash val="solid"/>
-                      <a:round/>
-                      <a:headEnd type="none" w="med" len="med"/>
-                      <a:tailEnd type="none" w="med" len="med"/>
-                    </a:lnR>
-                    <a:lnT w="12700" cap="flat" cmpd="sng" algn="ctr">
-                      <a:solidFill>
-                        <a:schemeClr val="tx1"/>
-                      </a:solidFill>
-                      <a:prstDash val="solid"/>
-                      <a:round/>
-                      <a:headEnd type="none" w="med" len="med"/>
-                      <a:tailEnd type="none" w="med" len="med"/>
-                    </a:lnT>
-                    <a:lnB w="12700" cap="flat" cmpd="sng" algn="ctr">
-                      <a:solidFill>
-                        <a:schemeClr val="tx1"/>
-                      </a:solidFill>
-                      <a:prstDash val="solid"/>
-                      <a:round/>
-                      <a:headEnd type="none" w="med" len="med"/>
-                      <a:tailEnd type="none" w="med" len="med"/>
-                    </a:lnB>
-                  </a:tcPr>
-                </a:tc>
-                <a:extLst>
-                  <a:ext uri="{0D108BD9-81ED-4DB2-BD59-A6C34878D82A}">
-                    <a16:rowId xmlns:a16="http://schemas.microsoft.com/office/drawing/2014/main" val="4198965824"/>
-                  </a:ext>
-                </a:extLst>
-              </a:tr>
-            </a:tbl>
-          </a:graphicData>
-        </a:graphic>
-      </p:graphicFrame>
-    </p:spTree>
-    <p:extLst>
-      <p:ext uri="{BB962C8B-B14F-4D97-AF65-F5344CB8AC3E}">
-        <p14:creationId xmlns:p14="http://schemas.microsoft.com/office/powerpoint/2010/main" val="1398170132"/>
-      </p:ext>
-    </p:extLst>
-  </p:cSld>
-  <p:clrMapOvr>
-    <a:masterClrMapping/>
-  </p:clrMapOvr>
-</p:sld>
-</file>
-
-<file path=ppt/slides/slide6.xml><?xml version="1.0" encoding="utf-8"?>
 <p:sld xmlns:a="http://schemas.openxmlformats.org/drawingml/2006/main" xmlns:r="http://schemas.openxmlformats.org/officeDocument/2006/relationships" xmlns:p="http://schemas.openxmlformats.org/presentationml/2006/main">
   <p:cSld>
     <p:spTree>
@@ -8042,7 +7036,7 @@
             </a:pPr>
             <a:fld id="{00000000-1234-1234-1234-123412341234}" type="slidenum">
               <a:rPr lang="en"/>
-              <a:t>6</a:t>
+              <a:t>5</a:t>
             </a:fld>
             <a:endParaRPr dirty="0"/>
           </a:p>
@@ -8191,7 +7185,7 @@
               </a:pPr>
               <a:r>
                 <a:rPr lang="en-GB" sz="1100" kern="1200" dirty="0"/>
-                <a:t>Finishing Data Wrangling including transformation and aggregation on the updated dataset provided by the Partner</a:t>
+                <a:t>Finish going through research papers</a:t>
               </a:r>
             </a:p>
           </p:txBody>
@@ -8323,7 +7317,7 @@
               </a:pPr>
               <a:r>
                 <a:rPr lang="en-GB" kern="1200" dirty="0"/>
-                <a:t>Data Wrangling</a:t>
+                <a:t>Research Papers</a:t>
               </a:r>
             </a:p>
           </p:txBody>
@@ -8472,7 +7466,7 @@
               </a:pPr>
               <a:r>
                 <a:rPr lang="en-GB" sz="1100" kern="1200" dirty="0"/>
-                <a:t>Data Analysis Completion and Feature Selection using some of the statistical techniques on the updated Dataset</a:t>
+                <a:t>Finish going through dataset and get the questions answered (if any) on the same</a:t>
               </a:r>
             </a:p>
           </p:txBody>
@@ -8597,7 +7591,7 @@
                     <a:srgbClr val="FFFFFF"/>
                   </a:solidFill>
                 </a:rPr>
-                <a:t>Data Exploration</a:t>
+                <a:t>Dataset</a:t>
               </a:r>
               <a:endParaRPr lang="en-GB" dirty="0"/>
             </a:p>
@@ -8781,163 +7775,218 @@
               <a:pPr lvl="0" algn="ctr"/>
               <a:r>
                 <a:rPr lang="en-GB" dirty="0"/>
-                <a:t>Machine Learning</a:t>
+                <a:t>Data Wrangling</a:t>
               </a:r>
             </a:p>
           </p:txBody>
         </p:sp>
       </p:grpSp>
-      <p:sp>
-        <p:nvSpPr>
-          <p:cNvPr id="22" name="Round Same-side Corner of Rectangle 21">
+      <p:grpSp>
+        <p:nvGrpSpPr>
+          <p:cNvPr id="21" name="Group 20">
             <a:extLst>
               <a:ext uri="{FF2B5EF4-FFF2-40B4-BE49-F238E27FC236}">
-                <a16:creationId xmlns:a16="http://schemas.microsoft.com/office/drawing/2014/main" id="{D9CACF13-C43D-DB4C-13A9-4439DEC17758}"/>
+                <a16:creationId xmlns:a16="http://schemas.microsoft.com/office/drawing/2014/main" id="{89258B83-441A-B3FA-D6FC-E7FD9DA80033}"/>
               </a:ext>
             </a:extLst>
           </p:cNvPr>
-          <p:cNvSpPr/>
+          <p:cNvGrpSpPr/>
           <p:nvPr/>
-        </p:nvSpPr>
-        <p:spPr>
-          <a:xfrm rot="5400000">
-            <a:off x="4454594" y="1596391"/>
-            <a:ext cx="774627" cy="4222911"/>
+        </p:nvGrpSpPr>
+        <p:grpSpPr>
+          <a:xfrm>
+            <a:off x="2711544" y="3320533"/>
+            <a:ext cx="4241819" cy="774627"/>
+            <a:chOff x="2000660" y="1767330"/>
+            <a:chExt cx="4241819" cy="774627"/>
           </a:xfrm>
-          <a:prstGeom prst="round2SameRect">
-            <a:avLst/>
-          </a:prstGeom>
-        </p:spPr>
-        <p:style>
-          <a:lnRef idx="2">
-            <a:schemeClr val="accent1">
-              <a:alpha val="90000"/>
-              <a:tint val="40000"/>
-              <a:hueOff val="0"/>
-              <a:satOff val="0"/>
-              <a:lumOff val="0"/>
-              <a:alphaOff val="0"/>
-            </a:schemeClr>
-          </a:lnRef>
-          <a:fillRef idx="1">
-            <a:schemeClr val="accent1">
-              <a:alpha val="90000"/>
-              <a:tint val="40000"/>
-              <a:hueOff val="0"/>
-              <a:satOff val="0"/>
-              <a:lumOff val="0"/>
-              <a:alphaOff val="0"/>
-            </a:schemeClr>
-          </a:fillRef>
-          <a:effectRef idx="0">
-            <a:schemeClr val="accent1">
-              <a:alpha val="90000"/>
-              <a:tint val="40000"/>
-              <a:hueOff val="0"/>
-              <a:satOff val="0"/>
-              <a:lumOff val="0"/>
-              <a:alphaOff val="0"/>
-            </a:schemeClr>
-          </a:effectRef>
-          <a:fontRef idx="minor">
-            <a:schemeClr val="dk1">
-              <a:hueOff val="0"/>
-              <a:satOff val="0"/>
-              <a:lumOff val="0"/>
-              <a:alphaOff val="0"/>
-            </a:schemeClr>
-          </a:fontRef>
-        </p:style>
-        <p:txBody>
-          <a:bodyPr/>
-          <a:lstStyle/>
-          <a:p>
-            <a:endParaRPr lang="en-IN"/>
-          </a:p>
-        </p:txBody>
-      </p:sp>
-      <p:sp>
-        <p:nvSpPr>
-          <p:cNvPr id="24" name="Round Same-side Corner of Rectangle 4">
-            <a:extLst>
-              <a:ext uri="{FF2B5EF4-FFF2-40B4-BE49-F238E27FC236}">
-                <a16:creationId xmlns:a16="http://schemas.microsoft.com/office/drawing/2014/main" id="{BB0C7B1D-37EB-494D-B98A-728588487EC0}"/>
-              </a:ext>
-            </a:extLst>
-          </p:cNvPr>
-          <p:cNvSpPr txBox="1"/>
-          <p:nvPr/>
-        </p:nvSpPr>
-        <p:spPr>
-          <a:xfrm>
-            <a:off x="2768266" y="3441491"/>
-            <a:ext cx="4185097" cy="620842"/>
-          </a:xfrm>
-          <a:prstGeom prst="rect">
-            <a:avLst/>
-          </a:prstGeom>
-        </p:spPr>
-        <p:style>
-          <a:lnRef idx="0">
-            <a:scrgbClr r="0" g="0" b="0"/>
-          </a:lnRef>
-          <a:fillRef idx="0">
-            <a:scrgbClr r="0" g="0" b="0"/>
-          </a:fillRef>
-          <a:effectRef idx="0">
-            <a:scrgbClr r="0" g="0" b="0"/>
-          </a:effectRef>
-          <a:fontRef idx="minor">
-            <a:schemeClr val="dk1">
-              <a:hueOff val="0"/>
-              <a:satOff val="0"/>
-              <a:lumOff val="0"/>
-              <a:alphaOff val="0"/>
-            </a:schemeClr>
-          </a:fontRef>
-        </p:style>
-        <p:txBody>
-          <a:bodyPr spcFirstLastPara="0" vert="horz" wrap="square" lIns="41910" tIns="20955" rIns="41910" bIns="20955" numCol="1" spcCol="1270" anchor="ctr" anchorCtr="0">
-            <a:noAutofit/>
-          </a:bodyPr>
-          <a:lstStyle/>
-          <a:p>
-            <a:pPr marL="171450" lvl="1" indent="-171450" defTabSz="488950">
-              <a:lnSpc>
-                <a:spcPct val="90000"/>
-              </a:lnSpc>
-              <a:spcBef>
-                <a:spcPct val="0"/>
-              </a:spcBef>
-              <a:spcAft>
-                <a:spcPct val="15000"/>
-              </a:spcAft>
-              <a:buFont typeface="Arial" panose="020B0604020202020204" pitchFamily="34" charset="0"/>
-              <a:buChar char="•"/>
-            </a:pPr>
-            <a:r>
-              <a:rPr lang="en-GB" sz="1100" kern="1200" dirty="0"/>
-              <a:t>Applying different Machine Learning Modelling for the crop yield prediction </a:t>
-            </a:r>
-          </a:p>
-          <a:p>
-            <a:pPr marL="171450" lvl="1" indent="-171450" algn="l" defTabSz="488950">
-              <a:lnSpc>
-                <a:spcPct val="90000"/>
-              </a:lnSpc>
-              <a:spcBef>
-                <a:spcPct val="0"/>
-              </a:spcBef>
-              <a:spcAft>
-                <a:spcPct val="15000"/>
-              </a:spcAft>
-              <a:buFont typeface="Arial" panose="020B0604020202020204" pitchFamily="34" charset="0"/>
-              <a:buChar char="•"/>
-            </a:pPr>
-            <a:endParaRPr lang="en-GB" sz="1100" kern="1200" dirty="0"/>
-          </a:p>
-        </p:txBody>
-      </p:sp>
+        </p:grpSpPr>
+        <p:sp>
+          <p:nvSpPr>
+            <p:cNvPr id="22" name="Round Same-side Corner of Rectangle 21">
+              <a:extLst>
+                <a:ext uri="{FF2B5EF4-FFF2-40B4-BE49-F238E27FC236}">
+                  <a16:creationId xmlns:a16="http://schemas.microsoft.com/office/drawing/2014/main" id="{D9CACF13-C43D-DB4C-13A9-4439DEC17758}"/>
+                </a:ext>
+              </a:extLst>
+            </p:cNvPr>
+            <p:cNvSpPr/>
+            <p:nvPr/>
+          </p:nvSpPr>
+          <p:spPr>
+            <a:xfrm rot="5400000">
+              <a:off x="3743710" y="43188"/>
+              <a:ext cx="774627" cy="4222911"/>
+            </a:xfrm>
+            <a:prstGeom prst="round2SameRect">
+              <a:avLst/>
+            </a:prstGeom>
+          </p:spPr>
+          <p:style>
+            <a:lnRef idx="2">
+              <a:schemeClr val="accent1">
+                <a:alpha val="90000"/>
+                <a:tint val="40000"/>
+                <a:hueOff val="0"/>
+                <a:satOff val="0"/>
+                <a:lumOff val="0"/>
+                <a:alphaOff val="0"/>
+              </a:schemeClr>
+            </a:lnRef>
+            <a:fillRef idx="1">
+              <a:schemeClr val="accent1">
+                <a:alpha val="90000"/>
+                <a:tint val="40000"/>
+                <a:hueOff val="0"/>
+                <a:satOff val="0"/>
+                <a:lumOff val="0"/>
+                <a:alphaOff val="0"/>
+              </a:schemeClr>
+            </a:fillRef>
+            <a:effectRef idx="0">
+              <a:schemeClr val="accent1">
+                <a:alpha val="90000"/>
+                <a:tint val="40000"/>
+                <a:hueOff val="0"/>
+                <a:satOff val="0"/>
+                <a:lumOff val="0"/>
+                <a:alphaOff val="0"/>
+              </a:schemeClr>
+            </a:effectRef>
+            <a:fontRef idx="minor">
+              <a:schemeClr val="dk1">
+                <a:hueOff val="0"/>
+                <a:satOff val="0"/>
+                <a:lumOff val="0"/>
+                <a:alphaOff val="0"/>
+              </a:schemeClr>
+            </a:fontRef>
+          </p:style>
+        </p:sp>
+        <p:sp>
+          <p:nvSpPr>
+            <p:cNvPr id="23" name="Round Same-side Corner of Rectangle 4">
+              <a:extLst>
+                <a:ext uri="{FF2B5EF4-FFF2-40B4-BE49-F238E27FC236}">
+                  <a16:creationId xmlns:a16="http://schemas.microsoft.com/office/drawing/2014/main" id="{E3FB8C6A-5652-9087-C39B-D8D8C0E76195}"/>
+                </a:ext>
+              </a:extLst>
+            </p:cNvPr>
+            <p:cNvSpPr txBox="1"/>
+            <p:nvPr/>
+          </p:nvSpPr>
+          <p:spPr>
+            <a:xfrm>
+              <a:off x="2000660" y="1787269"/>
+              <a:ext cx="4185097" cy="698999"/>
+            </a:xfrm>
+            <a:prstGeom prst="rect">
+              <a:avLst/>
+            </a:prstGeom>
+          </p:spPr>
+          <p:style>
+            <a:lnRef idx="0">
+              <a:scrgbClr r="0" g="0" b="0"/>
+            </a:lnRef>
+            <a:fillRef idx="0">
+              <a:scrgbClr r="0" g="0" b="0"/>
+            </a:fillRef>
+            <a:effectRef idx="0">
+              <a:scrgbClr r="0" g="0" b="0"/>
+            </a:effectRef>
+            <a:fontRef idx="minor">
+              <a:schemeClr val="dk1">
+                <a:hueOff val="0"/>
+                <a:satOff val="0"/>
+                <a:lumOff val="0"/>
+                <a:alphaOff val="0"/>
+              </a:schemeClr>
+            </a:fontRef>
+          </p:style>
+          <p:txBody>
+            <a:bodyPr spcFirstLastPara="0" vert="horz" wrap="square" lIns="41910" tIns="20955" rIns="41910" bIns="20955" numCol="2" spcCol="1270" anchor="ctr" anchorCtr="0">
+              <a:noAutofit/>
+            </a:bodyPr>
+            <a:lstStyle/>
+            <a:p>
+              <a:pPr marL="171450" lvl="1" indent="-171450" algn="l" defTabSz="488950">
+                <a:lnSpc>
+                  <a:spcPct val="90000"/>
+                </a:lnSpc>
+                <a:spcBef>
+                  <a:spcPct val="0"/>
+                </a:spcBef>
+                <a:spcAft>
+                  <a:spcPct val="15000"/>
+                </a:spcAft>
+                <a:buFont typeface="Arial" panose="020B0604020202020204" pitchFamily="34" charset="0"/>
+                <a:buChar char="•"/>
+              </a:pPr>
+              <a:r>
+                <a:rPr lang="en-GB" sz="1100" kern="1200" dirty="0"/>
+                <a:t>Data loading</a:t>
+              </a:r>
+            </a:p>
+            <a:p>
+              <a:pPr marL="171450" lvl="1" indent="-171450" algn="l" defTabSz="488950">
+                <a:lnSpc>
+                  <a:spcPct val="90000"/>
+                </a:lnSpc>
+                <a:spcBef>
+                  <a:spcPct val="0"/>
+                </a:spcBef>
+                <a:spcAft>
+                  <a:spcPct val="15000"/>
+                </a:spcAft>
+                <a:buFont typeface="Arial" panose="020B0604020202020204" pitchFamily="34" charset="0"/>
+                <a:buChar char="•"/>
+              </a:pPr>
+              <a:r>
+                <a:rPr lang="en-GB" sz="1100" kern="1200" dirty="0"/>
+                <a:t>Data cleaning</a:t>
+              </a:r>
+            </a:p>
+            <a:p>
+              <a:pPr marL="171450" lvl="1" indent="-171450" algn="l" defTabSz="488950">
+                <a:lnSpc>
+                  <a:spcPct val="90000"/>
+                </a:lnSpc>
+                <a:spcBef>
+                  <a:spcPct val="0"/>
+                </a:spcBef>
+                <a:spcAft>
+                  <a:spcPct val="15000"/>
+                </a:spcAft>
+                <a:buFont typeface="Arial" panose="020B0604020202020204" pitchFamily="34" charset="0"/>
+                <a:buChar char="•"/>
+              </a:pPr>
+              <a:r>
+                <a:rPr lang="en-GB" sz="1100" kern="1200" dirty="0"/>
+                <a:t>Merging data frames</a:t>
+              </a:r>
+            </a:p>
+            <a:p>
+              <a:pPr marL="171450" lvl="1" indent="-171450" algn="l" defTabSz="488950">
+                <a:lnSpc>
+                  <a:spcPct val="90000"/>
+                </a:lnSpc>
+                <a:spcBef>
+                  <a:spcPct val="0"/>
+                </a:spcBef>
+                <a:spcAft>
+                  <a:spcPct val="15000"/>
+                </a:spcAft>
+                <a:buFont typeface="Arial" panose="020B0604020202020204" pitchFamily="34" charset="0"/>
+                <a:buChar char="•"/>
+              </a:pPr>
+              <a:r>
+                <a:rPr lang="en-GB" sz="1100" kern="1200" dirty="0"/>
+                <a:t>Data transformation and aggregation</a:t>
+              </a:r>
+            </a:p>
+          </p:txBody>
+        </p:sp>
+      </p:grpSp>
     </p:spTree>
     <p:extLst>
       <p:ext uri="{BB962C8B-B14F-4D97-AF65-F5344CB8AC3E}">
@@ -8951,7 +8000,7 @@
 </p:sld>
 </file>
 
-<file path=ppt/slides/slide7.xml><?xml version="1.0" encoding="utf-8"?>
+<file path=ppt/slides/slide6.xml><?xml version="1.0" encoding="utf-8"?>
 <p:sld xmlns:a="http://schemas.openxmlformats.org/drawingml/2006/main" xmlns:r="http://schemas.openxmlformats.org/officeDocument/2006/relationships" xmlns:p="http://schemas.openxmlformats.org/presentationml/2006/main">
   <p:cSld>
     <p:spTree>
@@ -9052,7 +8101,7 @@
             </a:pPr>
             <a:fld id="{00000000-1234-1234-1234-123412341234}" type="slidenum">
               <a:rPr lang="en"/>
-              <a:t>7</a:t>
+              <a:t>6</a:t>
             </a:fld>
             <a:endParaRPr/>
           </a:p>

</xml_diff>